<commit_message>
small edits to lecture notes
</commit_message>
<xml_diff>
--- a/assets/ppt/parsing/lr4-lr_1-parsing.pptx
+++ b/assets/ppt/parsing/lr4-lr_1-parsing.pptx
@@ -246,7 +246,7 @@
           <a:p>
             <a:fld id="{8FB9796E-8218-104C-80DE-FD5737E53010}" type="datetimeFigureOut">
               <a:rPr lang="en-US" smtClean="0"/>
-              <a:t>16-06-21</a:t>
+              <a:t>16-06-23</a:t>
             </a:fld>
             <a:endParaRPr lang="en-US"/>
           </a:p>
@@ -2839,7 +2839,7 @@
           <a:p>
             <a:fld id="{2F270F5C-5A48-8241-B091-F405DE7C6ACC}" type="datetime1">
               <a:rPr lang="en-CA" smtClean="0"/>
-              <a:t>16-06-21</a:t>
+              <a:t>16-06-23</a:t>
             </a:fld>
             <a:endParaRPr lang="en-US"/>
           </a:p>
@@ -3017,7 +3017,7 @@
           <a:p>
             <a:fld id="{E16EE01E-84E8-E443-B4A3-1AE6BD62501F}" type="datetime1">
               <a:rPr lang="en-CA" smtClean="0"/>
-              <a:t>16-06-21</a:t>
+              <a:t>16-06-23</a:t>
             </a:fld>
             <a:endParaRPr lang="en-US"/>
           </a:p>
@@ -3205,7 +3205,7 @@
           <a:p>
             <a:fld id="{D0F14A5E-0A78-3249-9925-3CFBAF6E1F0E}" type="datetime1">
               <a:rPr lang="en-CA" smtClean="0"/>
-              <a:t>16-06-21</a:t>
+              <a:t>16-06-23</a:t>
             </a:fld>
             <a:endParaRPr lang="en-US"/>
           </a:p>
@@ -3383,7 +3383,7 @@
           <a:p>
             <a:fld id="{C1C37086-67A3-2342-AD89-C77608DB7761}" type="datetime1">
               <a:rPr lang="en-CA" smtClean="0"/>
-              <a:t>16-06-21</a:t>
+              <a:t>16-06-23</a:t>
             </a:fld>
             <a:endParaRPr lang="en-US"/>
           </a:p>
@@ -3583,7 +3583,7 @@
           <a:p>
             <a:fld id="{04E11F60-B584-9641-914B-0EAD3DA39502}" type="datetime1">
               <a:rPr lang="en-CA" smtClean="0"/>
-              <a:t>16-06-21</a:t>
+              <a:t>16-06-23</a:t>
             </a:fld>
             <a:endParaRPr lang="en-US"/>
           </a:p>
@@ -3879,7 +3879,7 @@
           <a:p>
             <a:fld id="{E7EC4DF0-9B2F-A74B-B1DD-B9BD48D0E1D9}" type="datetime1">
               <a:rPr lang="en-CA" smtClean="0"/>
-              <a:t>16-06-21</a:t>
+              <a:t>16-06-23</a:t>
             </a:fld>
             <a:endParaRPr lang="en-US"/>
           </a:p>
@@ -4314,7 +4314,7 @@
           <a:p>
             <a:fld id="{1055E8D5-8125-D445-A73D-D3CCADC235D8}" type="datetime1">
               <a:rPr lang="en-CA" smtClean="0"/>
-              <a:t>16-06-21</a:t>
+              <a:t>16-06-23</a:t>
             </a:fld>
             <a:endParaRPr lang="en-US"/>
           </a:p>
@@ -4440,7 +4440,7 @@
           <a:p>
             <a:fld id="{0750B902-920F-FE47-88E2-7BE6A95380FA}" type="datetime1">
               <a:rPr lang="en-CA" smtClean="0"/>
-              <a:t>16-06-21</a:t>
+              <a:t>16-06-23</a:t>
             </a:fld>
             <a:endParaRPr lang="en-US"/>
           </a:p>
@@ -4543,7 +4543,7 @@
           <a:p>
             <a:fld id="{594BD06D-16A7-4F43-A9E5-0AAAD0DA006C}" type="datetime1">
               <a:rPr lang="en-CA" smtClean="0"/>
-              <a:t>16-06-21</a:t>
+              <a:t>16-06-23</a:t>
             </a:fld>
             <a:endParaRPr lang="en-US"/>
           </a:p>
@@ -4828,7 +4828,7 @@
           <a:p>
             <a:fld id="{C7734B11-A6CE-BD4F-A5AF-B3E7D11B962B}" type="datetime1">
               <a:rPr lang="en-CA" smtClean="0"/>
-              <a:t>16-06-21</a:t>
+              <a:t>16-06-23</a:t>
             </a:fld>
             <a:endParaRPr lang="en-US"/>
           </a:p>
@@ -5089,7 +5089,7 @@
           <a:p>
             <a:fld id="{3533D83A-2538-4449-B73C-861382C6DF64}" type="datetime1">
               <a:rPr lang="en-CA" smtClean="0"/>
-              <a:t>16-06-21</a:t>
+              <a:t>16-06-23</a:t>
             </a:fld>
             <a:endParaRPr lang="en-US"/>
           </a:p>
@@ -5337,7 +5337,7 @@
           <a:p>
             <a:fld id="{76653872-9FEA-6C4D-B595-BF1990C11142}" type="datetime1">
               <a:rPr lang="en-CA" smtClean="0"/>
-              <a:t>16-06-21</a:t>
+              <a:t>16-06-23</a:t>
             </a:fld>
             <a:endParaRPr lang="en-US" dirty="0"/>
           </a:p>
@@ -6074,43 +6074,7 @@
                 <a:cs typeface="Calibri"/>
                 <a:sym typeface="Calibri"/>
               </a:rPr>
-              <a:t>LR4: </a:t>
-            </a:r>
-            <a:r>
-              <a:rPr lang="en-US" sz="2400" dirty="0" smtClean="0">
-                <a:solidFill>
-                  <a:schemeClr val="dk1"/>
-                </a:solidFill>
-                <a:latin typeface="Calibri"/>
-                <a:ea typeface="Calibri"/>
-                <a:cs typeface="Calibri"/>
-                <a:sym typeface="Calibri"/>
-              </a:rPr>
-              <a:t>LR</a:t>
-            </a:r>
-            <a:r>
-              <a:rPr lang="en-US" sz="2400" dirty="0" smtClean="0">
-                <a:solidFill>
-                  <a:schemeClr val="dk1"/>
-                </a:solidFill>
-                <a:latin typeface="Calibri"/>
-                <a:ea typeface="Calibri"/>
-                <a:cs typeface="Calibri"/>
-                <a:sym typeface="Calibri"/>
-              </a:rPr>
-              <a:t>(1) </a:t>
-            </a:r>
-            <a:r>
-              <a:rPr lang="en-US" sz="2400" dirty="0" smtClean="0">
-                <a:solidFill>
-                  <a:schemeClr val="dk1"/>
-                </a:solidFill>
-                <a:latin typeface="Calibri"/>
-                <a:ea typeface="Calibri"/>
-                <a:cs typeface="Calibri"/>
-                <a:sym typeface="Calibri"/>
-              </a:rPr>
-              <a:t>Parsing</a:t>
+              <a:t>LR4: LR(1) Parsing</a:t>
             </a:r>
             <a:endParaRPr lang="en-US" sz="2400" dirty="0">
               <a:solidFill>
@@ -35877,1401 +35841,6 @@
                                           </p:stCondLst>
                                         </p:cTn>
                                         <p:tgtEl>
-                                          <p:spTgt spid="7"/>
-                                        </p:tgtEl>
-                                        <p:attrNameLst>
-                                          <p:attrName>style.visibility</p:attrName>
-                                        </p:attrNameLst>
-                                      </p:cBhvr>
-                                      <p:to>
-                                        <p:strVal val="visible"/>
-                                      </p:to>
-                                    </p:set>
-                                  </p:childTnLst>
-                                </p:cTn>
-                              </p:par>
-                            </p:childTnLst>
-                          </p:cTn>
-                        </p:par>
-                      </p:childTnLst>
-                    </p:cTn>
-                  </p:par>
-                  <p:par>
-                    <p:cTn id="7" fill="hold">
-                      <p:stCondLst>
-                        <p:cond delay="indefinite"/>
-                      </p:stCondLst>
-                      <p:childTnLst>
-                        <p:par>
-                          <p:cTn id="8" fill="hold">
-                            <p:stCondLst>
-                              <p:cond delay="0"/>
-                            </p:stCondLst>
-                            <p:childTnLst>
-                              <p:par>
-                                <p:cTn id="9" presetID="1" presetClass="entr" presetSubtype="0" fill="hold" nodeType="clickEffect">
-                                  <p:stCondLst>
-                                    <p:cond delay="0"/>
-                                  </p:stCondLst>
-                                  <p:childTnLst>
-                                    <p:set>
-                                      <p:cBhvr>
-                                        <p:cTn id="10" dur="1" fill="hold">
-                                          <p:stCondLst>
-                                            <p:cond delay="0"/>
-                                          </p:stCondLst>
-                                        </p:cTn>
-                                        <p:tgtEl>
-                                          <p:spTgt spid="114"/>
-                                        </p:tgtEl>
-                                        <p:attrNameLst>
-                                          <p:attrName>style.visibility</p:attrName>
-                                        </p:attrNameLst>
-                                      </p:cBhvr>
-                                      <p:to>
-                                        <p:strVal val="visible"/>
-                                      </p:to>
-                                    </p:set>
-                                  </p:childTnLst>
-                                </p:cTn>
-                              </p:par>
-                            </p:childTnLst>
-                          </p:cTn>
-                        </p:par>
-                      </p:childTnLst>
-                    </p:cTn>
-                  </p:par>
-                  <p:par>
-                    <p:cTn id="11" fill="hold">
-                      <p:stCondLst>
-                        <p:cond delay="indefinite"/>
-                      </p:stCondLst>
-                      <p:childTnLst>
-                        <p:par>
-                          <p:cTn id="12" fill="hold">
-                            <p:stCondLst>
-                              <p:cond delay="0"/>
-                            </p:stCondLst>
-                            <p:childTnLst>
-                              <p:par>
-                                <p:cTn id="13" presetID="1" presetClass="entr" presetSubtype="0" fill="hold" nodeType="clickEffect">
-                                  <p:stCondLst>
-                                    <p:cond delay="0"/>
-                                  </p:stCondLst>
-                                  <p:childTnLst>
-                                    <p:set>
-                                      <p:cBhvr>
-                                        <p:cTn id="14" dur="1" fill="hold">
-                                          <p:stCondLst>
-                                            <p:cond delay="0"/>
-                                          </p:stCondLst>
-                                        </p:cTn>
-                                        <p:tgtEl>
-                                          <p:spTgt spid="115"/>
-                                        </p:tgtEl>
-                                        <p:attrNameLst>
-                                          <p:attrName>style.visibility</p:attrName>
-                                        </p:attrNameLst>
-                                      </p:cBhvr>
-                                      <p:to>
-                                        <p:strVal val="visible"/>
-                                      </p:to>
-                                    </p:set>
-                                  </p:childTnLst>
-                                </p:cTn>
-                              </p:par>
-                            </p:childTnLst>
-                          </p:cTn>
-                        </p:par>
-                      </p:childTnLst>
-                    </p:cTn>
-                  </p:par>
-                  <p:par>
-                    <p:cTn id="15" fill="hold">
-                      <p:stCondLst>
-                        <p:cond delay="indefinite"/>
-                      </p:stCondLst>
-                      <p:childTnLst>
-                        <p:par>
-                          <p:cTn id="16" fill="hold">
-                            <p:stCondLst>
-                              <p:cond delay="0"/>
-                            </p:stCondLst>
-                            <p:childTnLst>
-                              <p:par>
-                                <p:cTn id="17" presetID="1" presetClass="entr" presetSubtype="0" fill="hold" nodeType="clickEffect">
-                                  <p:stCondLst>
-                                    <p:cond delay="0"/>
-                                  </p:stCondLst>
-                                  <p:childTnLst>
-                                    <p:set>
-                                      <p:cBhvr>
-                                        <p:cTn id="18" dur="1" fill="hold">
-                                          <p:stCondLst>
-                                            <p:cond delay="0"/>
-                                          </p:stCondLst>
-                                        </p:cTn>
-                                        <p:tgtEl>
-                                          <p:spTgt spid="116"/>
-                                        </p:tgtEl>
-                                        <p:attrNameLst>
-                                          <p:attrName>style.visibility</p:attrName>
-                                        </p:attrNameLst>
-                                      </p:cBhvr>
-                                      <p:to>
-                                        <p:strVal val="visible"/>
-                                      </p:to>
-                                    </p:set>
-                                  </p:childTnLst>
-                                </p:cTn>
-                              </p:par>
-                            </p:childTnLst>
-                          </p:cTn>
-                        </p:par>
-                      </p:childTnLst>
-                    </p:cTn>
-                  </p:par>
-                  <p:par>
-                    <p:cTn id="19" fill="hold">
-                      <p:stCondLst>
-                        <p:cond delay="indefinite"/>
-                      </p:stCondLst>
-                      <p:childTnLst>
-                        <p:par>
-                          <p:cTn id="20" fill="hold">
-                            <p:stCondLst>
-                              <p:cond delay="0"/>
-                            </p:stCondLst>
-                            <p:childTnLst>
-                              <p:par>
-                                <p:cTn id="21" presetID="1" presetClass="entr" presetSubtype="0" fill="hold" nodeType="clickEffect">
-                                  <p:stCondLst>
-                                    <p:cond delay="0"/>
-                                  </p:stCondLst>
-                                  <p:childTnLst>
-                                    <p:set>
-                                      <p:cBhvr>
-                                        <p:cTn id="22" dur="1" fill="hold">
-                                          <p:stCondLst>
-                                            <p:cond delay="0"/>
-                                          </p:stCondLst>
-                                        </p:cTn>
-                                        <p:tgtEl>
-                                          <p:spTgt spid="117"/>
-                                        </p:tgtEl>
-                                        <p:attrNameLst>
-                                          <p:attrName>style.visibility</p:attrName>
-                                        </p:attrNameLst>
-                                      </p:cBhvr>
-                                      <p:to>
-                                        <p:strVal val="visible"/>
-                                      </p:to>
-                                    </p:set>
-                                  </p:childTnLst>
-                                </p:cTn>
-                              </p:par>
-                            </p:childTnLst>
-                          </p:cTn>
-                        </p:par>
-                      </p:childTnLst>
-                    </p:cTn>
-                  </p:par>
-                  <p:par>
-                    <p:cTn id="23" fill="hold">
-                      <p:stCondLst>
-                        <p:cond delay="indefinite"/>
-                      </p:stCondLst>
-                      <p:childTnLst>
-                        <p:par>
-                          <p:cTn id="24" fill="hold">
-                            <p:stCondLst>
-                              <p:cond delay="0"/>
-                            </p:stCondLst>
-                            <p:childTnLst>
-                              <p:par>
-                                <p:cTn id="25" presetID="1" presetClass="entr" presetSubtype="0" fill="hold" grpId="0" nodeType="clickEffect">
-                                  <p:stCondLst>
-                                    <p:cond delay="0"/>
-                                  </p:stCondLst>
-                                  <p:childTnLst>
-                                    <p:set>
-                                      <p:cBhvr>
-                                        <p:cTn id="26" dur="1" fill="hold">
-                                          <p:stCondLst>
-                                            <p:cond delay="0"/>
-                                          </p:stCondLst>
-                                        </p:cTn>
-                                        <p:tgtEl>
-                                          <p:spTgt spid="27"/>
-                                        </p:tgtEl>
-                                        <p:attrNameLst>
-                                          <p:attrName>style.visibility</p:attrName>
-                                        </p:attrNameLst>
-                                      </p:cBhvr>
-                                      <p:to>
-                                        <p:strVal val="visible"/>
-                                      </p:to>
-                                    </p:set>
-                                  </p:childTnLst>
-                                </p:cTn>
-                              </p:par>
-                            </p:childTnLst>
-                          </p:cTn>
-                        </p:par>
-                      </p:childTnLst>
-                    </p:cTn>
-                  </p:par>
-                  <p:par>
-                    <p:cTn id="27" fill="hold">
-                      <p:stCondLst>
-                        <p:cond delay="indefinite"/>
-                      </p:stCondLst>
-                      <p:childTnLst>
-                        <p:par>
-                          <p:cTn id="28" fill="hold">
-                            <p:stCondLst>
-                              <p:cond delay="0"/>
-                            </p:stCondLst>
-                            <p:childTnLst>
-                              <p:par>
-                                <p:cTn id="29" presetID="1" presetClass="entr" presetSubtype="0" fill="hold" nodeType="clickEffect">
-                                  <p:stCondLst>
-                                    <p:cond delay="0"/>
-                                  </p:stCondLst>
-                                  <p:childTnLst>
-                                    <p:set>
-                                      <p:cBhvr>
-                                        <p:cTn id="30" dur="1" fill="hold">
-                                          <p:stCondLst>
-                                            <p:cond delay="0"/>
-                                          </p:stCondLst>
-                                        </p:cTn>
-                                        <p:tgtEl>
-                                          <p:spTgt spid="118"/>
-                                        </p:tgtEl>
-                                        <p:attrNameLst>
-                                          <p:attrName>style.visibility</p:attrName>
-                                        </p:attrNameLst>
-                                      </p:cBhvr>
-                                      <p:to>
-                                        <p:strVal val="visible"/>
-                                      </p:to>
-                                    </p:set>
-                                  </p:childTnLst>
-                                </p:cTn>
-                              </p:par>
-                            </p:childTnLst>
-                          </p:cTn>
-                        </p:par>
-                      </p:childTnLst>
-                    </p:cTn>
-                  </p:par>
-                  <p:par>
-                    <p:cTn id="31" fill="hold">
-                      <p:stCondLst>
-                        <p:cond delay="indefinite"/>
-                      </p:stCondLst>
-                      <p:childTnLst>
-                        <p:par>
-                          <p:cTn id="32" fill="hold">
-                            <p:stCondLst>
-                              <p:cond delay="0"/>
-                            </p:stCondLst>
-                            <p:childTnLst>
-                              <p:par>
-                                <p:cTn id="33" presetID="1" presetClass="entr" presetSubtype="0" fill="hold" nodeType="clickEffect">
-                                  <p:stCondLst>
-                                    <p:cond delay="0"/>
-                                  </p:stCondLst>
-                                  <p:childTnLst>
-                                    <p:set>
-                                      <p:cBhvr>
-                                        <p:cTn id="34" dur="1" fill="hold">
-                                          <p:stCondLst>
-                                            <p:cond delay="0"/>
-                                          </p:stCondLst>
-                                        </p:cTn>
-                                        <p:tgtEl>
-                                          <p:spTgt spid="119"/>
-                                        </p:tgtEl>
-                                        <p:attrNameLst>
-                                          <p:attrName>style.visibility</p:attrName>
-                                        </p:attrNameLst>
-                                      </p:cBhvr>
-                                      <p:to>
-                                        <p:strVal val="visible"/>
-                                      </p:to>
-                                    </p:set>
-                                  </p:childTnLst>
-                                </p:cTn>
-                              </p:par>
-                            </p:childTnLst>
-                          </p:cTn>
-                        </p:par>
-                      </p:childTnLst>
-                    </p:cTn>
-                  </p:par>
-                  <p:par>
-                    <p:cTn id="35" fill="hold">
-                      <p:stCondLst>
-                        <p:cond delay="indefinite"/>
-                      </p:stCondLst>
-                      <p:childTnLst>
-                        <p:par>
-                          <p:cTn id="36" fill="hold">
-                            <p:stCondLst>
-                              <p:cond delay="0"/>
-                            </p:stCondLst>
-                            <p:childTnLst>
-                              <p:par>
-                                <p:cTn id="37" presetID="1" presetClass="entr" presetSubtype="0" fill="hold" nodeType="clickEffect">
-                                  <p:stCondLst>
-                                    <p:cond delay="0"/>
-                                  </p:stCondLst>
-                                  <p:childTnLst>
-                                    <p:set>
-                                      <p:cBhvr>
-                                        <p:cTn id="38" dur="1" fill="hold">
-                                          <p:stCondLst>
-                                            <p:cond delay="0"/>
-                                          </p:stCondLst>
-                                        </p:cTn>
-                                        <p:tgtEl>
-                                          <p:spTgt spid="120"/>
-                                        </p:tgtEl>
-                                        <p:attrNameLst>
-                                          <p:attrName>style.visibility</p:attrName>
-                                        </p:attrNameLst>
-                                      </p:cBhvr>
-                                      <p:to>
-                                        <p:strVal val="visible"/>
-                                      </p:to>
-                                    </p:set>
-                                  </p:childTnLst>
-                                </p:cTn>
-                              </p:par>
-                            </p:childTnLst>
-                          </p:cTn>
-                        </p:par>
-                      </p:childTnLst>
-                    </p:cTn>
-                  </p:par>
-                  <p:par>
-                    <p:cTn id="39" fill="hold">
-                      <p:stCondLst>
-                        <p:cond delay="indefinite"/>
-                      </p:stCondLst>
-                      <p:childTnLst>
-                        <p:par>
-                          <p:cTn id="40" fill="hold">
-                            <p:stCondLst>
-                              <p:cond delay="0"/>
-                            </p:stCondLst>
-                            <p:childTnLst>
-                              <p:par>
-                                <p:cTn id="41" presetID="1" presetClass="entr" presetSubtype="0" fill="hold" nodeType="clickEffect">
-                                  <p:stCondLst>
-                                    <p:cond delay="0"/>
-                                  </p:stCondLst>
-                                  <p:childTnLst>
-                                    <p:set>
-                                      <p:cBhvr>
-                                        <p:cTn id="42" dur="1" fill="hold">
-                                          <p:stCondLst>
-                                            <p:cond delay="0"/>
-                                          </p:stCondLst>
-                                        </p:cTn>
-                                        <p:tgtEl>
-                                          <p:spTgt spid="121"/>
-                                        </p:tgtEl>
-                                        <p:attrNameLst>
-                                          <p:attrName>style.visibility</p:attrName>
-                                        </p:attrNameLst>
-                                      </p:cBhvr>
-                                      <p:to>
-                                        <p:strVal val="visible"/>
-                                      </p:to>
-                                    </p:set>
-                                  </p:childTnLst>
-                                </p:cTn>
-                              </p:par>
-                            </p:childTnLst>
-                          </p:cTn>
-                        </p:par>
-                      </p:childTnLst>
-                    </p:cTn>
-                  </p:par>
-                  <p:par>
-                    <p:cTn id="43" fill="hold">
-                      <p:stCondLst>
-                        <p:cond delay="indefinite"/>
-                      </p:stCondLst>
-                      <p:childTnLst>
-                        <p:par>
-                          <p:cTn id="44" fill="hold">
-                            <p:stCondLst>
-                              <p:cond delay="0"/>
-                            </p:stCondLst>
-                            <p:childTnLst>
-                              <p:par>
-                                <p:cTn id="45" presetID="1" presetClass="entr" presetSubtype="0" fill="hold" nodeType="clickEffect">
-                                  <p:stCondLst>
-                                    <p:cond delay="0"/>
-                                  </p:stCondLst>
-                                  <p:childTnLst>
-                                    <p:set>
-                                      <p:cBhvr>
-                                        <p:cTn id="46" dur="1" fill="hold">
-                                          <p:stCondLst>
-                                            <p:cond delay="0"/>
-                                          </p:stCondLst>
-                                        </p:cTn>
-                                        <p:tgtEl>
-                                          <p:spTgt spid="122"/>
-                                        </p:tgtEl>
-                                        <p:attrNameLst>
-                                          <p:attrName>style.visibility</p:attrName>
-                                        </p:attrNameLst>
-                                      </p:cBhvr>
-                                      <p:to>
-                                        <p:strVal val="visible"/>
-                                      </p:to>
-                                    </p:set>
-                                  </p:childTnLst>
-                                </p:cTn>
-                              </p:par>
-                            </p:childTnLst>
-                          </p:cTn>
-                        </p:par>
-                      </p:childTnLst>
-                    </p:cTn>
-                  </p:par>
-                  <p:par>
-                    <p:cTn id="47" fill="hold">
-                      <p:stCondLst>
-                        <p:cond delay="indefinite"/>
-                      </p:stCondLst>
-                      <p:childTnLst>
-                        <p:par>
-                          <p:cTn id="48" fill="hold">
-                            <p:stCondLst>
-                              <p:cond delay="0"/>
-                            </p:stCondLst>
-                            <p:childTnLst>
-                              <p:par>
-                                <p:cTn id="49" presetID="1" presetClass="entr" presetSubtype="0" fill="hold" grpId="0" nodeType="clickEffect">
-                                  <p:stCondLst>
-                                    <p:cond delay="0"/>
-                                  </p:stCondLst>
-                                  <p:childTnLst>
-                                    <p:set>
-                                      <p:cBhvr>
-                                        <p:cTn id="50" dur="1" fill="hold">
-                                          <p:stCondLst>
-                                            <p:cond delay="0"/>
-                                          </p:stCondLst>
-                                        </p:cTn>
-                                        <p:tgtEl>
-                                          <p:spTgt spid="76"/>
-                                        </p:tgtEl>
-                                        <p:attrNameLst>
-                                          <p:attrName>style.visibility</p:attrName>
-                                        </p:attrNameLst>
-                                      </p:cBhvr>
-                                      <p:to>
-                                        <p:strVal val="visible"/>
-                                      </p:to>
-                                    </p:set>
-                                  </p:childTnLst>
-                                </p:cTn>
-                              </p:par>
-                            </p:childTnLst>
-                          </p:cTn>
-                        </p:par>
-                      </p:childTnLst>
-                    </p:cTn>
-                  </p:par>
-                  <p:par>
-                    <p:cTn id="51" fill="hold">
-                      <p:stCondLst>
-                        <p:cond delay="indefinite"/>
-                      </p:stCondLst>
-                      <p:childTnLst>
-                        <p:par>
-                          <p:cTn id="52" fill="hold">
-                            <p:stCondLst>
-                              <p:cond delay="0"/>
-                            </p:stCondLst>
-                            <p:childTnLst>
-                              <p:par>
-                                <p:cTn id="53" presetID="1" presetClass="entr" presetSubtype="0" fill="hold" nodeType="clickEffect">
-                                  <p:stCondLst>
-                                    <p:cond delay="0"/>
-                                  </p:stCondLst>
-                                  <p:childTnLst>
-                                    <p:set>
-                                      <p:cBhvr>
-                                        <p:cTn id="54" dur="1" fill="hold">
-                                          <p:stCondLst>
-                                            <p:cond delay="0"/>
-                                          </p:stCondLst>
-                                        </p:cTn>
-                                        <p:tgtEl>
-                                          <p:spTgt spid="123"/>
-                                        </p:tgtEl>
-                                        <p:attrNameLst>
-                                          <p:attrName>style.visibility</p:attrName>
-                                        </p:attrNameLst>
-                                      </p:cBhvr>
-                                      <p:to>
-                                        <p:strVal val="visible"/>
-                                      </p:to>
-                                    </p:set>
-                                  </p:childTnLst>
-                                </p:cTn>
-                              </p:par>
-                            </p:childTnLst>
-                          </p:cTn>
-                        </p:par>
-                      </p:childTnLst>
-                    </p:cTn>
-                  </p:par>
-                  <p:par>
-                    <p:cTn id="55" fill="hold">
-                      <p:stCondLst>
-                        <p:cond delay="indefinite"/>
-                      </p:stCondLst>
-                      <p:childTnLst>
-                        <p:par>
-                          <p:cTn id="56" fill="hold">
-                            <p:stCondLst>
-                              <p:cond delay="0"/>
-                            </p:stCondLst>
-                            <p:childTnLst>
-                              <p:par>
-                                <p:cTn id="57" presetID="1" presetClass="entr" presetSubtype="0" fill="hold" nodeType="clickEffect">
-                                  <p:stCondLst>
-                                    <p:cond delay="0"/>
-                                  </p:stCondLst>
-                                  <p:childTnLst>
-                                    <p:set>
-                                      <p:cBhvr>
-                                        <p:cTn id="58" dur="1" fill="hold">
-                                          <p:stCondLst>
-                                            <p:cond delay="0"/>
-                                          </p:stCondLst>
-                                        </p:cTn>
-                                        <p:tgtEl>
-                                          <p:spTgt spid="124"/>
-                                        </p:tgtEl>
-                                        <p:attrNameLst>
-                                          <p:attrName>style.visibility</p:attrName>
-                                        </p:attrNameLst>
-                                      </p:cBhvr>
-                                      <p:to>
-                                        <p:strVal val="visible"/>
-                                      </p:to>
-                                    </p:set>
-                                  </p:childTnLst>
-                                </p:cTn>
-                              </p:par>
-                            </p:childTnLst>
-                          </p:cTn>
-                        </p:par>
-                      </p:childTnLst>
-                    </p:cTn>
-                  </p:par>
-                  <p:par>
-                    <p:cTn id="59" fill="hold">
-                      <p:stCondLst>
-                        <p:cond delay="indefinite"/>
-                      </p:stCondLst>
-                      <p:childTnLst>
-                        <p:par>
-                          <p:cTn id="60" fill="hold">
-                            <p:stCondLst>
-                              <p:cond delay="0"/>
-                            </p:stCondLst>
-                            <p:childTnLst>
-                              <p:par>
-                                <p:cTn id="61" presetID="1" presetClass="entr" presetSubtype="0" fill="hold" nodeType="clickEffect">
-                                  <p:stCondLst>
-                                    <p:cond delay="0"/>
-                                  </p:stCondLst>
-                                  <p:childTnLst>
-                                    <p:set>
-                                      <p:cBhvr>
-                                        <p:cTn id="62" dur="1" fill="hold">
-                                          <p:stCondLst>
-                                            <p:cond delay="0"/>
-                                          </p:stCondLst>
-                                        </p:cTn>
-                                        <p:tgtEl>
-                                          <p:spTgt spid="125"/>
-                                        </p:tgtEl>
-                                        <p:attrNameLst>
-                                          <p:attrName>style.visibility</p:attrName>
-                                        </p:attrNameLst>
-                                      </p:cBhvr>
-                                      <p:to>
-                                        <p:strVal val="visible"/>
-                                      </p:to>
-                                    </p:set>
-                                  </p:childTnLst>
-                                </p:cTn>
-                              </p:par>
-                            </p:childTnLst>
-                          </p:cTn>
-                        </p:par>
-                      </p:childTnLst>
-                    </p:cTn>
-                  </p:par>
-                  <p:par>
-                    <p:cTn id="63" fill="hold">
-                      <p:stCondLst>
-                        <p:cond delay="indefinite"/>
-                      </p:stCondLst>
-                      <p:childTnLst>
-                        <p:par>
-                          <p:cTn id="64" fill="hold">
-                            <p:stCondLst>
-                              <p:cond delay="0"/>
-                            </p:stCondLst>
-                            <p:childTnLst>
-                              <p:par>
-                                <p:cTn id="65" presetID="1" presetClass="entr" presetSubtype="0" fill="hold" nodeType="clickEffect">
-                                  <p:stCondLst>
-                                    <p:cond delay="0"/>
-                                  </p:stCondLst>
-                                  <p:childTnLst>
-                                    <p:set>
-                                      <p:cBhvr>
-                                        <p:cTn id="66" dur="1" fill="hold">
-                                          <p:stCondLst>
-                                            <p:cond delay="0"/>
-                                          </p:stCondLst>
-                                        </p:cTn>
-                                        <p:tgtEl>
-                                          <p:spTgt spid="126"/>
-                                        </p:tgtEl>
-                                        <p:attrNameLst>
-                                          <p:attrName>style.visibility</p:attrName>
-                                        </p:attrNameLst>
-                                      </p:cBhvr>
-                                      <p:to>
-                                        <p:strVal val="visible"/>
-                                      </p:to>
-                                    </p:set>
-                                  </p:childTnLst>
-                                </p:cTn>
-                              </p:par>
-                            </p:childTnLst>
-                          </p:cTn>
-                        </p:par>
-                      </p:childTnLst>
-                    </p:cTn>
-                  </p:par>
-                  <p:par>
-                    <p:cTn id="67" fill="hold">
-                      <p:stCondLst>
-                        <p:cond delay="indefinite"/>
-                      </p:stCondLst>
-                      <p:childTnLst>
-                        <p:par>
-                          <p:cTn id="68" fill="hold">
-                            <p:stCondLst>
-                              <p:cond delay="0"/>
-                            </p:stCondLst>
-                            <p:childTnLst>
-                              <p:par>
-                                <p:cTn id="69" presetID="1" presetClass="entr" presetSubtype="0" fill="hold" nodeType="clickEffect">
-                                  <p:stCondLst>
-                                    <p:cond delay="0"/>
-                                  </p:stCondLst>
-                                  <p:childTnLst>
-                                    <p:set>
-                                      <p:cBhvr>
-                                        <p:cTn id="70" dur="1" fill="hold">
-                                          <p:stCondLst>
-                                            <p:cond delay="0"/>
-                                          </p:stCondLst>
-                                        </p:cTn>
-                                        <p:tgtEl>
-                                          <p:spTgt spid="127"/>
-                                        </p:tgtEl>
-                                        <p:attrNameLst>
-                                          <p:attrName>style.visibility</p:attrName>
-                                        </p:attrNameLst>
-                                      </p:cBhvr>
-                                      <p:to>
-                                        <p:strVal val="visible"/>
-                                      </p:to>
-                                    </p:set>
-                                  </p:childTnLst>
-                                </p:cTn>
-                              </p:par>
-                            </p:childTnLst>
-                          </p:cTn>
-                        </p:par>
-                      </p:childTnLst>
-                    </p:cTn>
-                  </p:par>
-                  <p:par>
-                    <p:cTn id="71" fill="hold">
-                      <p:stCondLst>
-                        <p:cond delay="indefinite"/>
-                      </p:stCondLst>
-                      <p:childTnLst>
-                        <p:par>
-                          <p:cTn id="72" fill="hold">
-                            <p:stCondLst>
-                              <p:cond delay="0"/>
-                            </p:stCondLst>
-                            <p:childTnLst>
-                              <p:par>
-                                <p:cTn id="73" presetID="1" presetClass="entr" presetSubtype="0" fill="hold" nodeType="clickEffect">
-                                  <p:stCondLst>
-                                    <p:cond delay="0"/>
-                                  </p:stCondLst>
-                                  <p:childTnLst>
-                                    <p:set>
-                                      <p:cBhvr>
-                                        <p:cTn id="74" dur="1" fill="hold">
-                                          <p:stCondLst>
-                                            <p:cond delay="0"/>
-                                          </p:stCondLst>
-                                        </p:cTn>
-                                        <p:tgtEl>
-                                          <p:spTgt spid="128"/>
-                                        </p:tgtEl>
-                                        <p:attrNameLst>
-                                          <p:attrName>style.visibility</p:attrName>
-                                        </p:attrNameLst>
-                                      </p:cBhvr>
-                                      <p:to>
-                                        <p:strVal val="visible"/>
-                                      </p:to>
-                                    </p:set>
-                                  </p:childTnLst>
-                                </p:cTn>
-                              </p:par>
-                            </p:childTnLst>
-                          </p:cTn>
-                        </p:par>
-                      </p:childTnLst>
-                    </p:cTn>
-                  </p:par>
-                  <p:par>
-                    <p:cTn id="75" fill="hold">
-                      <p:stCondLst>
-                        <p:cond delay="indefinite"/>
-                      </p:stCondLst>
-                      <p:childTnLst>
-                        <p:par>
-                          <p:cTn id="76" fill="hold">
-                            <p:stCondLst>
-                              <p:cond delay="0"/>
-                            </p:stCondLst>
-                            <p:childTnLst>
-                              <p:par>
-                                <p:cTn id="77" presetID="1" presetClass="entr" presetSubtype="0" fill="hold" grpId="0" nodeType="clickEffect">
-                                  <p:stCondLst>
-                                    <p:cond delay="0"/>
-                                  </p:stCondLst>
-                                  <p:childTnLst>
-                                    <p:set>
-                                      <p:cBhvr>
-                                        <p:cTn id="78" dur="1" fill="hold">
-                                          <p:stCondLst>
-                                            <p:cond delay="0"/>
-                                          </p:stCondLst>
-                                        </p:cTn>
-                                        <p:tgtEl>
-                                          <p:spTgt spid="102"/>
-                                        </p:tgtEl>
-                                        <p:attrNameLst>
-                                          <p:attrName>style.visibility</p:attrName>
-                                        </p:attrNameLst>
-                                      </p:cBhvr>
-                                      <p:to>
-                                        <p:strVal val="visible"/>
-                                      </p:to>
-                                    </p:set>
-                                  </p:childTnLst>
-                                </p:cTn>
-                              </p:par>
-                            </p:childTnLst>
-                          </p:cTn>
-                        </p:par>
-                      </p:childTnLst>
-                    </p:cTn>
-                  </p:par>
-                  <p:par>
-                    <p:cTn id="79" fill="hold">
-                      <p:stCondLst>
-                        <p:cond delay="indefinite"/>
-                      </p:stCondLst>
-                      <p:childTnLst>
-                        <p:par>
-                          <p:cTn id="80" fill="hold">
-                            <p:stCondLst>
-                              <p:cond delay="0"/>
-                            </p:stCondLst>
-                            <p:childTnLst>
-                              <p:par>
-                                <p:cTn id="81" presetID="1" presetClass="entr" presetSubtype="0" fill="hold" grpId="0" nodeType="clickEffect">
-                                  <p:stCondLst>
-                                    <p:cond delay="0"/>
-                                  </p:stCondLst>
-                                  <p:childTnLst>
-                                    <p:set>
-                                      <p:cBhvr>
-                                        <p:cTn id="82" dur="1" fill="hold">
-                                          <p:stCondLst>
-                                            <p:cond delay="0"/>
-                                          </p:stCondLst>
-                                        </p:cTn>
-                                        <p:tgtEl>
-                                          <p:spTgt spid="103"/>
-                                        </p:tgtEl>
-                                        <p:attrNameLst>
-                                          <p:attrName>style.visibility</p:attrName>
-                                        </p:attrNameLst>
-                                      </p:cBhvr>
-                                      <p:to>
-                                        <p:strVal val="visible"/>
-                                      </p:to>
-                                    </p:set>
-                                  </p:childTnLst>
-                                </p:cTn>
-                              </p:par>
-                            </p:childTnLst>
-                          </p:cTn>
-                        </p:par>
-                      </p:childTnLst>
-                    </p:cTn>
-                  </p:par>
-                  <p:par>
-                    <p:cTn id="83" fill="hold">
-                      <p:stCondLst>
-                        <p:cond delay="indefinite"/>
-                      </p:stCondLst>
-                      <p:childTnLst>
-                        <p:par>
-                          <p:cTn id="84" fill="hold">
-                            <p:stCondLst>
-                              <p:cond delay="0"/>
-                            </p:stCondLst>
-                            <p:childTnLst>
-                              <p:par>
-                                <p:cTn id="85" presetID="1" presetClass="entr" presetSubtype="0" fill="hold" grpId="0" nodeType="clickEffect">
-                                  <p:stCondLst>
-                                    <p:cond delay="0"/>
-                                  </p:stCondLst>
-                                  <p:childTnLst>
-                                    <p:set>
-                                      <p:cBhvr>
-                                        <p:cTn id="86" dur="1" fill="hold">
-                                          <p:stCondLst>
-                                            <p:cond delay="0"/>
-                                          </p:stCondLst>
-                                        </p:cTn>
-                                        <p:tgtEl>
-                                          <p:spTgt spid="105"/>
-                                        </p:tgtEl>
-                                        <p:attrNameLst>
-                                          <p:attrName>style.visibility</p:attrName>
-                                        </p:attrNameLst>
-                                      </p:cBhvr>
-                                      <p:to>
-                                        <p:strVal val="visible"/>
-                                      </p:to>
-                                    </p:set>
-                                  </p:childTnLst>
-                                </p:cTn>
-                              </p:par>
-                            </p:childTnLst>
-                          </p:cTn>
-                        </p:par>
-                      </p:childTnLst>
-                    </p:cTn>
-                  </p:par>
-                  <p:par>
-                    <p:cTn id="87" fill="hold">
-                      <p:stCondLst>
-                        <p:cond delay="indefinite"/>
-                      </p:stCondLst>
-                      <p:childTnLst>
-                        <p:par>
-                          <p:cTn id="88" fill="hold">
-                            <p:stCondLst>
-                              <p:cond delay="0"/>
-                            </p:stCondLst>
-                            <p:childTnLst>
-                              <p:par>
-                                <p:cTn id="89" presetID="1" presetClass="entr" presetSubtype="0" fill="hold" grpId="0" nodeType="clickEffect">
-                                  <p:stCondLst>
-                                    <p:cond delay="0"/>
-                                  </p:stCondLst>
-                                  <p:childTnLst>
-                                    <p:set>
-                                      <p:cBhvr>
-                                        <p:cTn id="90" dur="1" fill="hold">
-                                          <p:stCondLst>
-                                            <p:cond delay="0"/>
-                                          </p:stCondLst>
-                                        </p:cTn>
-                                        <p:tgtEl>
-                                          <p:spTgt spid="107"/>
-                                        </p:tgtEl>
-                                        <p:attrNameLst>
-                                          <p:attrName>style.visibility</p:attrName>
-                                        </p:attrNameLst>
-                                      </p:cBhvr>
-                                      <p:to>
-                                        <p:strVal val="visible"/>
-                                      </p:to>
-                                    </p:set>
-                                  </p:childTnLst>
-                                </p:cTn>
-                              </p:par>
-                            </p:childTnLst>
-                          </p:cTn>
-                        </p:par>
-                      </p:childTnLst>
-                    </p:cTn>
-                  </p:par>
-                  <p:par>
-                    <p:cTn id="91" fill="hold">
-                      <p:stCondLst>
-                        <p:cond delay="indefinite"/>
-                      </p:stCondLst>
-                      <p:childTnLst>
-                        <p:par>
-                          <p:cTn id="92" fill="hold">
-                            <p:stCondLst>
-                              <p:cond delay="0"/>
-                            </p:stCondLst>
-                            <p:childTnLst>
-                              <p:par>
-                                <p:cTn id="93" presetID="1" presetClass="entr" presetSubtype="0" fill="hold" grpId="0" nodeType="clickEffect">
-                                  <p:stCondLst>
-                                    <p:cond delay="0"/>
-                                  </p:stCondLst>
-                                  <p:childTnLst>
-                                    <p:set>
-                                      <p:cBhvr>
-                                        <p:cTn id="94" dur="1" fill="hold">
-                                          <p:stCondLst>
-                                            <p:cond delay="0"/>
-                                          </p:stCondLst>
-                                        </p:cTn>
-                                        <p:tgtEl>
-                                          <p:spTgt spid="51"/>
-                                        </p:tgtEl>
-                                        <p:attrNameLst>
-                                          <p:attrName>style.visibility</p:attrName>
-                                        </p:attrNameLst>
-                                      </p:cBhvr>
-                                      <p:to>
-                                        <p:strVal val="visible"/>
-                                      </p:to>
-                                    </p:set>
-                                  </p:childTnLst>
-                                </p:cTn>
-                              </p:par>
-                            </p:childTnLst>
-                          </p:cTn>
-                        </p:par>
-                      </p:childTnLst>
-                    </p:cTn>
-                  </p:par>
-                  <p:par>
-                    <p:cTn id="95" fill="hold">
-                      <p:stCondLst>
-                        <p:cond delay="indefinite"/>
-                      </p:stCondLst>
-                      <p:childTnLst>
-                        <p:par>
-                          <p:cTn id="96" fill="hold">
-                            <p:stCondLst>
-                              <p:cond delay="0"/>
-                            </p:stCondLst>
-                            <p:childTnLst>
-                              <p:par>
-                                <p:cTn id="97" presetID="1" presetClass="entr" presetSubtype="0" fill="hold" nodeType="clickEffect">
-                                  <p:stCondLst>
-                                    <p:cond delay="0"/>
-                                  </p:stCondLst>
-                                  <p:childTnLst>
-                                    <p:set>
-                                      <p:cBhvr>
-                                        <p:cTn id="98" dur="1" fill="hold">
-                                          <p:stCondLst>
-                                            <p:cond delay="0"/>
-                                          </p:stCondLst>
-                                        </p:cTn>
-                                        <p:tgtEl>
-                                          <p:spTgt spid="129"/>
-                                        </p:tgtEl>
-                                        <p:attrNameLst>
-                                          <p:attrName>style.visibility</p:attrName>
-                                        </p:attrNameLst>
-                                      </p:cBhvr>
-                                      <p:to>
-                                        <p:strVal val="visible"/>
-                                      </p:to>
-                                    </p:set>
-                                  </p:childTnLst>
-                                </p:cTn>
-                              </p:par>
-                            </p:childTnLst>
-                          </p:cTn>
-                        </p:par>
-                      </p:childTnLst>
-                    </p:cTn>
-                  </p:par>
-                  <p:par>
-                    <p:cTn id="99" fill="hold">
-                      <p:stCondLst>
-                        <p:cond delay="indefinite"/>
-                      </p:stCondLst>
-                      <p:childTnLst>
-                        <p:par>
-                          <p:cTn id="100" fill="hold">
-                            <p:stCondLst>
-                              <p:cond delay="0"/>
-                            </p:stCondLst>
-                            <p:childTnLst>
-                              <p:par>
-                                <p:cTn id="101" presetID="1" presetClass="entr" presetSubtype="0" fill="hold" nodeType="clickEffect">
-                                  <p:stCondLst>
-                                    <p:cond delay="0"/>
-                                  </p:stCondLst>
-                                  <p:childTnLst>
-                                    <p:set>
-                                      <p:cBhvr>
-                                        <p:cTn id="102" dur="1" fill="hold">
-                                          <p:stCondLst>
-                                            <p:cond delay="0"/>
-                                          </p:stCondLst>
-                                        </p:cTn>
-                                        <p:tgtEl>
-                                          <p:spTgt spid="134"/>
-                                        </p:tgtEl>
-                                        <p:attrNameLst>
-                                          <p:attrName>style.visibility</p:attrName>
-                                        </p:attrNameLst>
-                                      </p:cBhvr>
-                                      <p:to>
-                                        <p:strVal val="visible"/>
-                                      </p:to>
-                                    </p:set>
-                                  </p:childTnLst>
-                                </p:cTn>
-                              </p:par>
-                            </p:childTnLst>
-                          </p:cTn>
-                        </p:par>
-                      </p:childTnLst>
-                    </p:cTn>
-                  </p:par>
-                  <p:par>
-                    <p:cTn id="103" fill="hold">
-                      <p:stCondLst>
-                        <p:cond delay="indefinite"/>
-                      </p:stCondLst>
-                      <p:childTnLst>
-                        <p:par>
-                          <p:cTn id="104" fill="hold">
-                            <p:stCondLst>
-                              <p:cond delay="0"/>
-                            </p:stCondLst>
-                            <p:childTnLst>
-                              <p:par>
-                                <p:cTn id="105" presetID="1" presetClass="entr" presetSubtype="0" fill="hold" nodeType="clickEffect">
-                                  <p:stCondLst>
-                                    <p:cond delay="0"/>
-                                  </p:stCondLst>
-                                  <p:childTnLst>
-                                    <p:set>
-                                      <p:cBhvr>
-                                        <p:cTn id="106" dur="1" fill="hold">
-                                          <p:stCondLst>
-                                            <p:cond delay="0"/>
-                                          </p:stCondLst>
-                                        </p:cTn>
-                                        <p:tgtEl>
-                                          <p:spTgt spid="133"/>
-                                        </p:tgtEl>
-                                        <p:attrNameLst>
-                                          <p:attrName>style.visibility</p:attrName>
-                                        </p:attrNameLst>
-                                      </p:cBhvr>
-                                      <p:to>
-                                        <p:strVal val="visible"/>
-                                      </p:to>
-                                    </p:set>
-                                  </p:childTnLst>
-                                </p:cTn>
-                              </p:par>
-                            </p:childTnLst>
-                          </p:cTn>
-                        </p:par>
-                      </p:childTnLst>
-                    </p:cTn>
-                  </p:par>
-                  <p:par>
-                    <p:cTn id="107" fill="hold">
-                      <p:stCondLst>
-                        <p:cond delay="indefinite"/>
-                      </p:stCondLst>
-                      <p:childTnLst>
-                        <p:par>
-                          <p:cTn id="108" fill="hold">
-                            <p:stCondLst>
-                              <p:cond delay="0"/>
-                            </p:stCondLst>
-                            <p:childTnLst>
-                              <p:par>
-                                <p:cTn id="109" presetID="1" presetClass="entr" presetSubtype="0" fill="hold" grpId="0" nodeType="clickEffect">
-                                  <p:stCondLst>
-                                    <p:cond delay="0"/>
-                                  </p:stCondLst>
-                                  <p:childTnLst>
-                                    <p:set>
-                                      <p:cBhvr>
-                                        <p:cTn id="110" dur="1" fill="hold">
-                                          <p:stCondLst>
-                                            <p:cond delay="0"/>
-                                          </p:stCondLst>
-                                        </p:cTn>
-                                        <p:tgtEl>
-                                          <p:spTgt spid="106"/>
-                                        </p:tgtEl>
-                                        <p:attrNameLst>
-                                          <p:attrName>style.visibility</p:attrName>
-                                        </p:attrNameLst>
-                                      </p:cBhvr>
-                                      <p:to>
-                                        <p:strVal val="visible"/>
-                                      </p:to>
-                                    </p:set>
-                                  </p:childTnLst>
-                                </p:cTn>
-                              </p:par>
-                            </p:childTnLst>
-                          </p:cTn>
-                        </p:par>
-                      </p:childTnLst>
-                    </p:cTn>
-                  </p:par>
-                  <p:par>
-                    <p:cTn id="111" fill="hold">
-                      <p:stCondLst>
-                        <p:cond delay="indefinite"/>
-                      </p:stCondLst>
-                      <p:childTnLst>
-                        <p:par>
-                          <p:cTn id="112" fill="hold">
-                            <p:stCondLst>
-                              <p:cond delay="0"/>
-                            </p:stCondLst>
-                            <p:childTnLst>
-                              <p:par>
-                                <p:cTn id="113" presetID="1" presetClass="entr" presetSubtype="0" fill="hold" nodeType="clickEffect">
-                                  <p:stCondLst>
-                                    <p:cond delay="0"/>
-                                  </p:stCondLst>
-                                  <p:childTnLst>
-                                    <p:set>
-                                      <p:cBhvr>
-                                        <p:cTn id="114" dur="1" fill="hold">
-                                          <p:stCondLst>
-                                            <p:cond delay="0"/>
-                                          </p:stCondLst>
-                                        </p:cTn>
-                                        <p:tgtEl>
-                                          <p:spTgt spid="131"/>
-                                        </p:tgtEl>
-                                        <p:attrNameLst>
-                                          <p:attrName>style.visibility</p:attrName>
-                                        </p:attrNameLst>
-                                      </p:cBhvr>
-                                      <p:to>
-                                        <p:strVal val="visible"/>
-                                      </p:to>
-                                    </p:set>
-                                  </p:childTnLst>
-                                </p:cTn>
-                              </p:par>
-                            </p:childTnLst>
-                          </p:cTn>
-                        </p:par>
-                      </p:childTnLst>
-                    </p:cTn>
-                  </p:par>
-                  <p:par>
-                    <p:cTn id="115" fill="hold">
-                      <p:stCondLst>
-                        <p:cond delay="indefinite"/>
-                      </p:stCondLst>
-                      <p:childTnLst>
-                        <p:par>
-                          <p:cTn id="116" fill="hold">
-                            <p:stCondLst>
-                              <p:cond delay="0"/>
-                            </p:stCondLst>
-                            <p:childTnLst>
-                              <p:par>
-                                <p:cTn id="117" presetID="1" presetClass="entr" presetSubtype="0" fill="hold" nodeType="clickEffect">
-                                  <p:stCondLst>
-                                    <p:cond delay="0"/>
-                                  </p:stCondLst>
-                                  <p:childTnLst>
-                                    <p:set>
-                                      <p:cBhvr>
-                                        <p:cTn id="118" dur="1" fill="hold">
-                                          <p:stCondLst>
-                                            <p:cond delay="0"/>
-                                          </p:stCondLst>
-                                        </p:cTn>
-                                        <p:tgtEl>
-                                          <p:spTgt spid="132"/>
-                                        </p:tgtEl>
-                                        <p:attrNameLst>
-                                          <p:attrName>style.visibility</p:attrName>
-                                        </p:attrNameLst>
-                                      </p:cBhvr>
-                                      <p:to>
-                                        <p:strVal val="visible"/>
-                                      </p:to>
-                                    </p:set>
-                                  </p:childTnLst>
-                                </p:cTn>
-                              </p:par>
-                            </p:childTnLst>
-                          </p:cTn>
-                        </p:par>
-                      </p:childTnLst>
-                    </p:cTn>
-                  </p:par>
-                  <p:par>
-                    <p:cTn id="119" fill="hold">
-                      <p:stCondLst>
-                        <p:cond delay="indefinite"/>
-                      </p:stCondLst>
-                      <p:childTnLst>
-                        <p:par>
-                          <p:cTn id="120" fill="hold">
-                            <p:stCondLst>
-                              <p:cond delay="0"/>
-                            </p:stCondLst>
-                            <p:childTnLst>
-                              <p:par>
-                                <p:cTn id="121" presetID="1" presetClass="entr" presetSubtype="0" fill="hold" grpId="0" nodeType="clickEffect">
-                                  <p:stCondLst>
-                                    <p:cond delay="0"/>
-                                  </p:stCondLst>
-                                  <p:childTnLst>
-                                    <p:set>
-                                      <p:cBhvr>
-                                        <p:cTn id="122" dur="1" fill="hold">
-                                          <p:stCondLst>
-                                            <p:cond delay="0"/>
-                                          </p:stCondLst>
-                                        </p:cTn>
-                                        <p:tgtEl>
-                                          <p:spTgt spid="104"/>
-                                        </p:tgtEl>
-                                        <p:attrNameLst>
-                                          <p:attrName>style.visibility</p:attrName>
-                                        </p:attrNameLst>
-                                      </p:cBhvr>
-                                      <p:to>
-                                        <p:strVal val="visible"/>
-                                      </p:to>
-                                    </p:set>
-                                  </p:childTnLst>
-                                </p:cTn>
-                              </p:par>
-                            </p:childTnLst>
-                          </p:cTn>
-                        </p:par>
-                      </p:childTnLst>
-                    </p:cTn>
-                  </p:par>
-                  <p:par>
-                    <p:cTn id="123" fill="hold">
-                      <p:stCondLst>
-                        <p:cond delay="indefinite"/>
-                      </p:stCondLst>
-                      <p:childTnLst>
-                        <p:par>
-                          <p:cTn id="124" fill="hold">
-                            <p:stCondLst>
-                              <p:cond delay="0"/>
-                            </p:stCondLst>
-                            <p:childTnLst>
-                              <p:par>
-                                <p:cTn id="125" presetID="1" presetClass="entr" presetSubtype="0" fill="hold" nodeType="clickEffect">
-                                  <p:stCondLst>
-                                    <p:cond delay="0"/>
-                                  </p:stCondLst>
-                                  <p:childTnLst>
-                                    <p:set>
-                                      <p:cBhvr>
-                                        <p:cTn id="126" dur="1" fill="hold">
-                                          <p:stCondLst>
-                                            <p:cond delay="0"/>
-                                          </p:stCondLst>
-                                        </p:cTn>
-                                        <p:tgtEl>
-                                          <p:spTgt spid="136"/>
-                                        </p:tgtEl>
-                                        <p:attrNameLst>
-                                          <p:attrName>style.visibility</p:attrName>
-                                        </p:attrNameLst>
-                                      </p:cBhvr>
-                                      <p:to>
-                                        <p:strVal val="visible"/>
-                                      </p:to>
-                                    </p:set>
-                                  </p:childTnLst>
-                                </p:cTn>
-                              </p:par>
-                            </p:childTnLst>
-                          </p:cTn>
-                        </p:par>
-                      </p:childTnLst>
-                    </p:cTn>
-                  </p:par>
-                  <p:par>
-                    <p:cTn id="127" fill="hold">
-                      <p:stCondLst>
-                        <p:cond delay="indefinite"/>
-                      </p:stCondLst>
-                      <p:childTnLst>
-                        <p:par>
-                          <p:cTn id="128" fill="hold">
-                            <p:stCondLst>
-                              <p:cond delay="0"/>
-                            </p:stCondLst>
-                            <p:childTnLst>
-                              <p:par>
-                                <p:cTn id="129" presetID="1" presetClass="entr" presetSubtype="0" fill="hold" grpId="0" nodeType="clickEffect">
-                                  <p:stCondLst>
-                                    <p:cond delay="0"/>
-                                  </p:stCondLst>
-                                  <p:childTnLst>
-                                    <p:set>
-                                      <p:cBhvr>
-                                        <p:cTn id="130" dur="1" fill="hold">
-                                          <p:stCondLst>
-                                            <p:cond delay="0"/>
-                                          </p:stCondLst>
-                                        </p:cTn>
-                                        <p:tgtEl>
                                           <p:spTgt spid="108"/>
                                         </p:tgtEl>
                                         <p:attrNameLst>
@@ -37313,16 +35882,6 @@
       </p:par>
     </p:tnLst>
     <p:bldLst>
-      <p:bldP spid="7" grpId="0"/>
-      <p:bldP spid="27" grpId="0"/>
-      <p:bldP spid="51" grpId="0"/>
-      <p:bldP spid="76" grpId="0"/>
-      <p:bldP spid="102" grpId="0" animBg="1"/>
-      <p:bldP spid="103" grpId="0" animBg="1"/>
-      <p:bldP spid="104" grpId="0" animBg="1"/>
-      <p:bldP spid="105" grpId="0" animBg="1"/>
-      <p:bldP spid="106" grpId="0" animBg="1"/>
-      <p:bldP spid="107" grpId="0" animBg="1"/>
       <p:bldP spid="108" grpId="0" animBg="1"/>
     </p:bldLst>
   </p:timing>
@@ -37786,22 +36345,22 @@
               <a:buNone/>
             </a:pPr>
             <a:r>
-              <a:rPr lang="en-US" sz="3600"/>
+              <a:rPr lang="en-US" sz="3600" dirty="0"/>
               <a:t>   S </a:t>
             </a:r>
             <a:r>
-              <a:rPr lang="en-US" sz="3600">
+              <a:rPr lang="en-US" sz="3600" dirty="0">
                 <a:sym typeface="Symbol" charset="2"/>
               </a:rPr>
               <a:t> B B</a:t>
             </a:r>
             <a:br>
-              <a:rPr lang="en-US" sz="3600">
+              <a:rPr lang="en-US" sz="3600" dirty="0">
                 <a:sym typeface="Symbol" charset="2"/>
               </a:rPr>
             </a:br>
             <a:r>
-              <a:rPr lang="en-US" sz="3600">
+              <a:rPr lang="en-US" sz="3600" dirty="0">
                 <a:sym typeface="Symbol" charset="2"/>
               </a:rPr>
               <a:t>B  a B | b</a:t>
@@ -37814,66 +36373,66 @@
               </a:lnSpc>
             </a:pPr>
             <a:r>
-              <a:rPr lang="en-US" i="1"/>
+              <a:rPr lang="en-US" i="1" dirty="0"/>
               <a:t>S</a:t>
             </a:r>
             <a:r>
-              <a:rPr lang="en-US"/>
+              <a:rPr lang="en-US" dirty="0"/>
               <a:t> </a:t>
             </a:r>
             <a:r>
-              <a:rPr lang="en-US">
+              <a:rPr lang="en-US" dirty="0">
                 <a:sym typeface="Symbol" charset="2"/>
               </a:rPr>
               <a:t>*</a:t>
             </a:r>
             <a:r>
-              <a:rPr lang="en-US" baseline="-25000">
+              <a:rPr lang="en-US" baseline="-25000" dirty="0" err="1">
                 <a:sym typeface="Symbol" charset="2"/>
               </a:rPr>
               <a:t>rm</a:t>
             </a:r>
             <a:r>
-              <a:rPr lang="en-US">
+              <a:rPr lang="en-US" dirty="0">
                 <a:sym typeface="Symbol" charset="2"/>
               </a:rPr>
               <a:t> </a:t>
             </a:r>
             <a:r>
-              <a:rPr lang="en-US" i="1">
+              <a:rPr lang="en-US" i="1" dirty="0" err="1">
                 <a:sym typeface="Symbol" charset="2"/>
               </a:rPr>
               <a:t>aaBab</a:t>
             </a:r>
             <a:r>
-              <a:rPr lang="en-US"/>
+              <a:rPr lang="en-US" dirty="0"/>
               <a:t> </a:t>
             </a:r>
             <a:r>
-              <a:rPr lang="en-US">
+              <a:rPr lang="en-US" dirty="0">
                 <a:sym typeface="Symbol" charset="2"/>
               </a:rPr>
               <a:t></a:t>
             </a:r>
             <a:r>
-              <a:rPr lang="en-US" baseline="-25000">
+              <a:rPr lang="en-US" baseline="-25000" dirty="0" err="1">
                 <a:sym typeface="Symbol" charset="2"/>
               </a:rPr>
               <a:t>rm</a:t>
             </a:r>
             <a:r>
-              <a:rPr lang="en-US">
+              <a:rPr lang="en-US" dirty="0">
                 <a:sym typeface="Symbol" charset="2"/>
               </a:rPr>
               <a:t> </a:t>
             </a:r>
             <a:r>
-              <a:rPr lang="en-US" i="1">
+              <a:rPr lang="en-US" i="1" dirty="0" err="1">
                 <a:sym typeface="Symbol" charset="2"/>
               </a:rPr>
               <a:t>aaaBab</a:t>
             </a:r>
-            <a:endParaRPr lang="en-US">
+            <a:endParaRPr lang="en-US" dirty="0">
               <a:sym typeface="Symbol" charset="2"/>
             </a:endParaRPr>
           </a:p>
@@ -37884,30 +36443,36 @@
               </a:lnSpc>
             </a:pPr>
             <a:r>
-              <a:rPr lang="en-US">
+              <a:rPr lang="en-US" dirty="0">
                 <a:sym typeface="Symbol" charset="2"/>
               </a:rPr>
               <a:t>Item [B  a </a:t>
             </a:r>
             <a:r>
-              <a:rPr lang="en-US" b="1">
+              <a:rPr lang="en-US" b="1" dirty="0">
                 <a:sym typeface="Symbol" charset="2"/>
               </a:rPr>
               <a:t></a:t>
             </a:r>
             <a:r>
-              <a:rPr lang="en-US">
-                <a:sym typeface="Symbol" charset="2"/>
-              </a:rPr>
-              <a:t> B, a] is valid for viable prefix </a:t>
-            </a:r>
-            <a:r>
-              <a:rPr lang="en-US" i="1">
+              <a:rPr lang="en-US" dirty="0">
+                <a:sym typeface="Symbol" charset="2"/>
+              </a:rPr>
+              <a:t> B, a] is valid for</a:t>
+            </a:r>
+            <a:r>
+              <a:rPr lang="en-US" b="1" dirty="0">
+                <a:sym typeface="Symbol" charset="2"/>
+              </a:rPr>
+              <a:t> viable prefix </a:t>
+            </a:r>
+            <a:r>
+              <a:rPr lang="en-US" i="1" dirty="0" err="1" smtClean="0">
                 <a:sym typeface="Symbol" charset="2"/>
               </a:rPr>
               <a:t>aaa</a:t>
             </a:r>
-            <a:endParaRPr lang="en-US">
+            <a:endParaRPr lang="en-US" dirty="0" smtClean="0">
               <a:sym typeface="Symbol" charset="2"/>
             </a:endParaRPr>
           </a:p>
@@ -37918,66 +36483,66 @@
               </a:lnSpc>
             </a:pPr>
             <a:r>
-              <a:rPr lang="en-US" i="1"/>
+              <a:rPr lang="en-US" i="1" dirty="0" smtClean="0"/>
               <a:t>S</a:t>
             </a:r>
             <a:r>
-              <a:rPr lang="en-US"/>
+              <a:rPr lang="en-US" dirty="0" smtClean="0"/>
               <a:t> </a:t>
             </a:r>
             <a:r>
-              <a:rPr lang="en-US">
+              <a:rPr lang="en-US" dirty="0" smtClean="0">
                 <a:sym typeface="Symbol" charset="2"/>
               </a:rPr>
               <a:t>*</a:t>
             </a:r>
             <a:r>
-              <a:rPr lang="en-US" baseline="-25000">
+              <a:rPr lang="en-US" baseline="-25000" dirty="0" err="1" smtClean="0">
                 <a:sym typeface="Symbol" charset="2"/>
               </a:rPr>
               <a:t>rm</a:t>
             </a:r>
             <a:r>
-              <a:rPr lang="en-US">
+              <a:rPr lang="en-US" dirty="0" smtClean="0">
                 <a:sym typeface="Symbol" charset="2"/>
               </a:rPr>
               <a:t> </a:t>
             </a:r>
             <a:r>
-              <a:rPr lang="en-US" i="1">
+              <a:rPr lang="en-US" i="1" dirty="0" err="1" smtClean="0">
                 <a:sym typeface="Symbol" charset="2"/>
               </a:rPr>
               <a:t>BaB</a:t>
             </a:r>
             <a:r>
-              <a:rPr lang="en-US"/>
+              <a:rPr lang="en-US" dirty="0" smtClean="0"/>
               <a:t> </a:t>
             </a:r>
             <a:r>
-              <a:rPr lang="en-US">
+              <a:rPr lang="en-US" dirty="0" smtClean="0">
                 <a:sym typeface="Symbol" charset="2"/>
               </a:rPr>
               <a:t></a:t>
             </a:r>
             <a:r>
-              <a:rPr lang="en-US" baseline="-25000">
+              <a:rPr lang="en-US" baseline="-25000" dirty="0" err="1" smtClean="0">
                 <a:sym typeface="Symbol" charset="2"/>
               </a:rPr>
               <a:t>rm</a:t>
             </a:r>
             <a:r>
-              <a:rPr lang="en-US">
+              <a:rPr lang="en-US" dirty="0" smtClean="0">
                 <a:sym typeface="Symbol" charset="2"/>
               </a:rPr>
               <a:t> </a:t>
             </a:r>
             <a:r>
-              <a:rPr lang="en-US" i="1">
+              <a:rPr lang="en-US" i="1" dirty="0" err="1" smtClean="0">
                 <a:sym typeface="Symbol" charset="2"/>
               </a:rPr>
               <a:t>BaaB</a:t>
             </a:r>
-            <a:endParaRPr lang="en-US">
+            <a:endParaRPr lang="en-US" dirty="0" smtClean="0">
               <a:sym typeface="Symbol" charset="2"/>
             </a:endParaRPr>
           </a:p>
@@ -37988,30 +36553,36 @@
               </a:lnSpc>
             </a:pPr>
             <a:r>
-              <a:rPr lang="en-US">
-                <a:sym typeface="Symbol" charset="2"/>
-              </a:rPr>
-              <a:t>Also, item [B  a </a:t>
-            </a:r>
-            <a:r>
-              <a:rPr lang="en-US" b="1">
+              <a:rPr lang="en-US" dirty="0" smtClean="0">
+                <a:sym typeface="Symbol" charset="2"/>
+              </a:rPr>
+              <a:t>Also</a:t>
+            </a:r>
+            <a:r>
+              <a:rPr lang="en-US" dirty="0">
+                <a:sym typeface="Symbol" charset="2"/>
+              </a:rPr>
+              <a:t>, item [B  a </a:t>
+            </a:r>
+            <a:r>
+              <a:rPr lang="en-US" b="1" dirty="0">
                 <a:sym typeface="Symbol" charset="2"/>
               </a:rPr>
               <a:t></a:t>
             </a:r>
             <a:r>
-              <a:rPr lang="en-US">
+              <a:rPr lang="en-US" dirty="0">
                 <a:sym typeface="Symbol" charset="2"/>
               </a:rPr>
               <a:t> B, $] is valid for viable prefix </a:t>
             </a:r>
             <a:r>
-              <a:rPr lang="en-US" i="1">
+              <a:rPr lang="en-US" i="1" dirty="0">
                 <a:sym typeface="Symbol" charset="2"/>
               </a:rPr>
               <a:t>Baa</a:t>
             </a:r>
-            <a:endParaRPr lang="en-US">
+            <a:endParaRPr lang="en-US" dirty="0">
               <a:sym typeface="Symbol" charset="2"/>
             </a:endParaRPr>
           </a:p>
@@ -38190,31 +36761,35 @@
           <a:lstStyle/>
           <a:p>
             <a:r>
-              <a:rPr lang="en-US"/>
+              <a:rPr lang="en-US" dirty="0"/>
               <a:t>S </a:t>
             </a:r>
             <a:r>
-              <a:rPr lang="en-US">
+              <a:rPr lang="en-US" dirty="0">
                 <a:sym typeface="Symbol" charset="2"/>
               </a:rPr>
               <a:t></a:t>
             </a:r>
             <a:r>
-              <a:rPr lang="en-US"/>
+              <a:rPr lang="en-US" dirty="0"/>
               <a:t> BB </a:t>
             </a:r>
             <a:r>
-              <a:rPr lang="en-US">
+              <a:rPr lang="en-US" dirty="0">
                 <a:sym typeface="Symbol" charset="2"/>
               </a:rPr>
               <a:t></a:t>
             </a:r>
             <a:r>
-              <a:rPr lang="en-US"/>
-              <a:t> Ba</a:t>
-            </a:r>
-            <a:r>
-              <a:rPr lang="en-US">
+              <a:rPr lang="en-US" dirty="0"/>
+              <a:t> </a:t>
+            </a:r>
+            <a:r>
+              <a:rPr lang="en-US" dirty="0" err="1"/>
+              <a:t>Ba</a:t>
+            </a:r>
+            <a:r>
+              <a:rPr lang="en-US" dirty="0" err="1">
                 <a:solidFill>
                   <a:schemeClr val="accent2"/>
                 </a:solidFill>
@@ -38222,33 +36797,281 @@
               <a:t>B</a:t>
             </a:r>
             <a:r>
-              <a:rPr lang="en-US"/>
+              <a:rPr lang="en-US" dirty="0"/>
               <a:t> </a:t>
             </a:r>
             <a:r>
-              <a:rPr lang="en-US">
+              <a:rPr lang="en-US" dirty="0">
                 <a:sym typeface="Symbol" charset="2"/>
               </a:rPr>
               <a:t></a:t>
             </a:r>
             <a:r>
-              <a:rPr lang="en-US"/>
-              <a:t> Ba</a:t>
-            </a:r>
-            <a:r>
-              <a:rPr lang="en-US">
+              <a:rPr lang="en-US" dirty="0"/>
+              <a:t> </a:t>
+            </a:r>
+            <a:r>
+              <a:rPr lang="en-US" dirty="0" err="1"/>
+              <a:t>Ba</a:t>
+            </a:r>
+            <a:r>
+              <a:rPr lang="en-US" dirty="0" err="1">
                 <a:solidFill>
                   <a:schemeClr val="accent2"/>
                 </a:solidFill>
               </a:rPr>
               <a:t>aB</a:t>
             </a:r>
-            <a:endParaRPr lang="en-US">
+            <a:endParaRPr lang="en-US" dirty="0">
               <a:sym typeface="Symbol" charset="2"/>
             </a:endParaRPr>
           </a:p>
         </p:txBody>
       </p:sp>
+      <p:grpSp>
+        <p:nvGrpSpPr>
+          <p:cNvPr id="4" name="Group 3"/>
+          <p:cNvGrpSpPr/>
+          <p:nvPr/>
+        </p:nvGrpSpPr>
+        <p:grpSpPr>
+          <a:xfrm>
+            <a:off x="4932040" y="4293096"/>
+            <a:ext cx="4013448" cy="830997"/>
+            <a:chOff x="4932040" y="4293096"/>
+            <a:chExt cx="4013448" cy="830997"/>
+          </a:xfrm>
+        </p:grpSpPr>
+        <p:sp>
+          <p:nvSpPr>
+            <p:cNvPr id="8" name="Text Box 5"/>
+            <p:cNvSpPr txBox="1">
+              <a:spLocks noChangeArrowheads="1"/>
+            </p:cNvSpPr>
+            <p:nvPr/>
+          </p:nvSpPr>
+          <p:spPr bwMode="auto">
+            <a:xfrm>
+              <a:off x="5364088" y="4293096"/>
+              <a:ext cx="3581400" cy="830997"/>
+            </a:xfrm>
+            <a:prstGeom prst="rect">
+              <a:avLst/>
+            </a:prstGeom>
+            <a:solidFill>
+              <a:schemeClr val="accent1"/>
+            </a:solidFill>
+            <a:ln w="9525">
+              <a:solidFill>
+                <a:schemeClr val="tx1"/>
+              </a:solidFill>
+              <a:miter lim="800000"/>
+              <a:headEnd/>
+              <a:tailEnd/>
+            </a:ln>
+            <a:effectLst/>
+          </p:spPr>
+          <p:txBody>
+            <a:bodyPr>
+              <a:prstTxWarp prst="textNoShape">
+                <a:avLst/>
+              </a:prstTxWarp>
+              <a:spAutoFit/>
+            </a:bodyPr>
+            <a:lstStyle/>
+            <a:p>
+              <a:r>
+                <a:rPr lang="en-US" dirty="0" smtClean="0"/>
+                <a:t>In </a:t>
+              </a:r>
+              <a:r>
+                <a:rPr lang="en-US" dirty="0" err="1" smtClean="0"/>
+                <a:t>Ba</a:t>
+              </a:r>
+              <a:r>
+                <a:rPr lang="en-US" dirty="0" err="1" smtClean="0">
+                  <a:solidFill>
+                    <a:schemeClr val="accent2"/>
+                  </a:solidFill>
+                </a:rPr>
+                <a:t>B</a:t>
+              </a:r>
+              <a:r>
+                <a:rPr lang="en-US" dirty="0" smtClean="0"/>
+                <a:t> </a:t>
+              </a:r>
+              <a:r>
+                <a:rPr lang="en-US" dirty="0">
+                  <a:sym typeface="Symbol" charset="2"/>
+                </a:rPr>
+                <a:t></a:t>
+              </a:r>
+              <a:r>
+                <a:rPr lang="en-US" dirty="0"/>
+                <a:t> </a:t>
+              </a:r>
+              <a:r>
+                <a:rPr lang="en-US" dirty="0" err="1" smtClean="0"/>
+                <a:t>Ba</a:t>
+              </a:r>
+              <a:r>
+                <a:rPr lang="en-US" dirty="0" err="1" smtClean="0">
+                  <a:solidFill>
+                    <a:schemeClr val="accent2"/>
+                  </a:solidFill>
+                </a:rPr>
+                <a:t>aB</a:t>
+              </a:r>
+              <a:r>
+                <a:rPr lang="en-US" dirty="0" smtClean="0">
+                  <a:solidFill>
+                    <a:schemeClr val="accent2"/>
+                  </a:solidFill>
+                </a:rPr>
+                <a:t> </a:t>
+              </a:r>
+              <a:r>
+                <a:rPr lang="en-US" dirty="0">
+                  <a:solidFill>
+                    <a:srgbClr val="000000"/>
+                  </a:solidFill>
+                </a:rPr>
+                <a:t>the</a:t>
+              </a:r>
+              <a:r>
+                <a:rPr lang="en-US" dirty="0">
+                  <a:solidFill>
+                    <a:schemeClr val="accent2"/>
+                  </a:solidFill>
+                </a:rPr>
+                <a:t> </a:t>
+              </a:r>
+              <a:r>
+                <a:rPr lang="en-US" dirty="0">
+                  <a:solidFill>
+                    <a:srgbClr val="000000"/>
+                  </a:solidFill>
+                </a:rPr>
+                <a:t>string</a:t>
+              </a:r>
+              <a:r>
+                <a:rPr lang="en-US" dirty="0">
+                  <a:solidFill>
+                    <a:schemeClr val="accent2"/>
+                  </a:solidFill>
+                </a:rPr>
+                <a:t> </a:t>
+              </a:r>
+              <a:r>
+                <a:rPr lang="en-US" dirty="0" err="1" smtClean="0">
+                  <a:solidFill>
+                    <a:schemeClr val="accent2"/>
+                  </a:solidFill>
+                </a:rPr>
+                <a:t>aB</a:t>
+              </a:r>
+              <a:r>
+                <a:rPr lang="en-US" dirty="0" smtClean="0">
+                  <a:solidFill>
+                    <a:schemeClr val="accent2"/>
+                  </a:solidFill>
+                </a:rPr>
+                <a:t> </a:t>
+              </a:r>
+              <a:r>
+                <a:rPr lang="en-US" dirty="0" smtClean="0">
+                  <a:solidFill>
+                    <a:srgbClr val="000000"/>
+                  </a:solidFill>
+                </a:rPr>
+                <a:t>is the </a:t>
+              </a:r>
+              <a:r>
+                <a:rPr lang="en-US" b="1" dirty="0" smtClean="0">
+                  <a:solidFill>
+                    <a:srgbClr val="000000"/>
+                  </a:solidFill>
+                </a:rPr>
+                <a:t>handle</a:t>
+              </a:r>
+              <a:r>
+                <a:rPr lang="en-US" dirty="0" smtClean="0">
+                  <a:solidFill>
+                    <a:srgbClr val="000000"/>
+                  </a:solidFill>
+                </a:rPr>
+                <a:t> </a:t>
+              </a:r>
+              <a:r>
+                <a:rPr lang="en-US" dirty="0" smtClean="0">
+                  <a:solidFill>
+                    <a:schemeClr val="accent2"/>
+                  </a:solidFill>
+                </a:rPr>
+                <a:t>(</a:t>
+              </a:r>
+              <a:r>
+                <a:rPr lang="en-US" dirty="0" err="1" smtClean="0">
+                  <a:solidFill>
+                    <a:srgbClr val="000000"/>
+                  </a:solidFill>
+                </a:rPr>
+                <a:t>rhs</a:t>
+              </a:r>
+              <a:r>
+                <a:rPr lang="en-US" dirty="0" smtClean="0">
+                  <a:solidFill>
+                    <a:srgbClr val="000000"/>
+                  </a:solidFill>
+                </a:rPr>
+                <a:t> of</a:t>
+              </a:r>
+              <a:r>
+                <a:rPr lang="en-US" dirty="0" smtClean="0">
+                  <a:solidFill>
+                    <a:schemeClr val="accent2"/>
+                  </a:solidFill>
+                </a:rPr>
+                <a:t> B)</a:t>
+              </a:r>
+              <a:endParaRPr lang="en-US" dirty="0">
+                <a:sym typeface="Symbol" charset="2"/>
+              </a:endParaRPr>
+            </a:p>
+          </p:txBody>
+        </p:sp>
+        <p:cxnSp>
+          <p:nvCxnSpPr>
+            <p:cNvPr id="3" name="Straight Arrow Connector 2"/>
+            <p:cNvCxnSpPr>
+              <a:stCxn id="8" idx="1"/>
+            </p:cNvCxnSpPr>
+            <p:nvPr/>
+          </p:nvCxnSpPr>
+          <p:spPr bwMode="auto">
+            <a:xfrm flipH="1">
+              <a:off x="4932040" y="4708595"/>
+              <a:ext cx="432048" cy="88557"/>
+            </a:xfrm>
+            <a:prstGeom prst="straightConnector1">
+              <a:avLst/>
+            </a:prstGeom>
+            <a:solidFill>
+              <a:schemeClr val="accent1"/>
+            </a:solidFill>
+            <a:ln w="9525" cap="flat" cmpd="sng" algn="ctr">
+              <a:solidFill>
+                <a:schemeClr val="tx1"/>
+              </a:solidFill>
+              <a:prstDash val="solid"/>
+              <a:round/>
+              <a:headEnd type="none" w="med" len="med"/>
+              <a:tailEnd type="arrow"/>
+            </a:ln>
+            <a:effectLst/>
+          </p:spPr>
+        </p:cxnSp>
+      </p:grpSp>
     </p:spTree>
   </p:cSld>
   <p:clrMapOvr>
@@ -38579,6 +37402,51 @@
                                         </p:cTn>
                                         <p:tgtEl>
                                           <p:spTgt spid="350213"/>
+                                        </p:tgtEl>
+                                        <p:attrNameLst>
+                                          <p:attrName>style.visibility</p:attrName>
+                                        </p:attrNameLst>
+                                      </p:cBhvr>
+                                      <p:to>
+                                        <p:strVal val="visible"/>
+                                      </p:to>
+                                    </p:set>
+                                  </p:childTnLst>
+                                </p:cTn>
+                              </p:par>
+                            </p:childTnLst>
+                          </p:cTn>
+                        </p:par>
+                      </p:childTnLst>
+                    </p:cTn>
+                  </p:par>
+                  <p:par>
+                    <p:cTn id="31" fill="hold">
+                      <p:stCondLst>
+                        <p:cond delay="indefinite"/>
+                      </p:stCondLst>
+                      <p:childTnLst>
+                        <p:par>
+                          <p:cTn id="32" fill="hold">
+                            <p:stCondLst>
+                              <p:cond delay="0"/>
+                            </p:stCondLst>
+                            <p:childTnLst>
+                              <p:par>
+                                <p:cTn id="33" presetID="1" presetClass="entr" presetSubtype="0" fill="hold" nodeType="clickEffect">
+                                  <p:stCondLst>
+                                    <p:cond delay="0"/>
+                                  </p:stCondLst>
+                                  <p:childTnLst>
+                                    <p:set>
+                                      <p:cBhvr>
+                                        <p:cTn id="34" dur="1" fill="hold">
+                                          <p:stCondLst>
+                                            <p:cond delay="0"/>
+                                          </p:stCondLst>
+                                        </p:cTn>
+                                        <p:tgtEl>
+                                          <p:spTgt spid="4"/>
                                         </p:tgtEl>
                                         <p:attrNameLst>
                                           <p:attrName>style.visibility</p:attrName>

</xml_diff>